<commit_message>
Add system name option
</commit_message>
<xml_diff>
--- a/doc/ppt/PlaatEnergy Design.pptx
+++ b/doc/ppt/PlaatEnergy Design.pptx
@@ -3692,11 +3692,7 @@
             <a:pPr algn="ctr"/>
             <a:r>
               <a:rPr lang="en-US" dirty="0" smtClean="0"/>
-              <a:t>s</a:t>
-            </a:r>
-            <a:r>
-              <a:rPr lang="en-US" dirty="0" smtClean="0"/>
-              <a:t>ensor scripts</a:t>
+              <a:t>sensor scripts</a:t>
             </a:r>
             <a:endParaRPr lang="nl-NL" dirty="0"/>
           </a:p>
@@ -3886,15 +3882,7 @@
             <a:pPr algn="ctr"/>
             <a:r>
               <a:rPr lang="en-US" dirty="0" smtClean="0"/>
-              <a:t>Business Logic + Data </a:t>
-            </a:r>
-            <a:r>
-              <a:rPr lang="en-US" dirty="0" smtClean="0"/>
-              <a:t>Aggregation algorithm </a:t>
-            </a:r>
-            <a:r>
-              <a:rPr lang="en-US" dirty="0" smtClean="0"/>
-              <a:t> layer</a:t>
+              <a:t>Business Logic + Data Aggregation algorithm  layer</a:t>
             </a:r>
             <a:endParaRPr lang="nl-NL" dirty="0"/>
           </a:p>
@@ -9262,83 +9250,16 @@
           </a:p>
         </p:txBody>
       </p:sp>
-      <p:pic>
-        <p:nvPicPr>
-          <p:cNvPr id="1037" name="Picture 13"/>
-          <p:cNvPicPr>
-            <a:picLocks noChangeAspect="1" noChangeArrowheads="1"/>
-          </p:cNvPicPr>
-          <p:nvPr/>
-        </p:nvPicPr>
-        <p:blipFill>
-          <a:blip r:embed="rId5" cstate="print"/>
-          <a:srcRect/>
-          <a:stretch>
-            <a:fillRect/>
-          </a:stretch>
-        </p:blipFill>
-        <p:spPr bwMode="auto">
-          <a:xfrm>
-            <a:off x="5076056" y="4581128"/>
-            <a:ext cx="2124075" cy="1581150"/>
-          </a:xfrm>
-          <a:prstGeom prst="rect">
-            <a:avLst/>
-          </a:prstGeom>
-          <a:noFill/>
-          <a:ln w="9525">
-            <a:noFill/>
-            <a:miter lim="800000"/>
-            <a:headEnd/>
-            <a:tailEnd/>
-          </a:ln>
-        </p:spPr>
-      </p:pic>
-      <p:cxnSp>
-        <p:nvCxnSpPr>
-          <p:cNvPr id="112" name="Rechte verbindingslijn met pijl 111"/>
-          <p:cNvCxnSpPr>
-            <a:stCxn id="5" idx="2"/>
-          </p:cNvCxnSpPr>
-          <p:nvPr/>
-        </p:nvCxnSpPr>
-        <p:spPr>
-          <a:xfrm>
-            <a:off x="6012160" y="4062556"/>
-            <a:ext cx="0" cy="518572"/>
-          </a:xfrm>
-          <a:prstGeom prst="straightConnector1">
-            <a:avLst/>
-          </a:prstGeom>
-          <a:ln w="28575">
-            <a:tailEnd type="arrow"/>
-          </a:ln>
-        </p:spPr>
-        <p:style>
-          <a:lnRef idx="1">
-            <a:schemeClr val="accent2"/>
-          </a:lnRef>
-          <a:fillRef idx="0">
-            <a:schemeClr val="accent2"/>
-          </a:fillRef>
-          <a:effectRef idx="0">
-            <a:schemeClr val="accent2"/>
-          </a:effectRef>
-          <a:fontRef idx="minor">
-            <a:schemeClr val="tx1"/>
-          </a:fontRef>
-        </p:style>
-      </p:cxnSp>
-      <p:sp>
-        <p:nvSpPr>
-          <p:cNvPr id="114" name="Tekstvak 113"/>
+      <p:sp>
+        <p:nvSpPr>
+          <p:cNvPr id="117" name="Tekstvak 116"/>
           <p:cNvSpPr txBox="1"/>
           <p:nvPr/>
         </p:nvSpPr>
         <p:spPr>
           <a:xfrm>
-            <a:off x="6012160" y="4221088"/>
-            <a:ext cx="936104" cy="276999"/>
+            <a:off x="7308304" y="1628800"/>
+            <a:ext cx="1080120" cy="276999"/>
           </a:xfrm>
           <a:prstGeom prst="rect">
             <a:avLst/>
@@ -9353,115 +9274,7 @@
           <a:p>
             <a:r>
               <a:rPr lang="en-US" sz="1200" dirty="0" smtClean="0"/>
-              <a:t>HDMI cable</a:t>
-            </a:r>
-            <a:endParaRPr lang="nl-NL" sz="1200" dirty="0"/>
-          </a:p>
-        </p:txBody>
-      </p:sp>
-      <p:sp>
-        <p:nvSpPr>
-          <p:cNvPr id="117" name="Tekstvak 116"/>
-          <p:cNvSpPr txBox="1"/>
-          <p:nvPr/>
-        </p:nvSpPr>
-        <p:spPr>
-          <a:xfrm>
-            <a:off x="7308304" y="1628800"/>
-            <a:ext cx="1080120" cy="276999"/>
-          </a:xfrm>
-          <a:prstGeom prst="rect">
-            <a:avLst/>
-          </a:prstGeom>
-          <a:noFill/>
-        </p:spPr>
-        <p:txBody>
-          <a:bodyPr wrap="square" rtlCol="0">
-            <a:spAutoFit/>
-          </a:bodyPr>
-          <a:lstStyle/>
-          <a:p>
-            <a:r>
-              <a:rPr lang="en-US" sz="1200" dirty="0" smtClean="0"/>
               <a:t>Bluetooth</a:t>
-            </a:r>
-            <a:endParaRPr lang="nl-NL" sz="1200" dirty="0"/>
-          </a:p>
-        </p:txBody>
-      </p:sp>
-      <p:pic>
-        <p:nvPicPr>
-          <p:cNvPr id="118" name="Picture 10"/>
-          <p:cNvPicPr>
-            <a:picLocks noChangeAspect="1" noChangeArrowheads="1"/>
-          </p:cNvPicPr>
-          <p:nvPr/>
-        </p:nvPicPr>
-        <p:blipFill>
-          <a:blip r:embed="rId4" cstate="print"/>
-          <a:srcRect/>
-          <a:stretch>
-            <a:fillRect/>
-          </a:stretch>
-        </p:blipFill>
-        <p:spPr bwMode="auto">
-          <a:xfrm>
-            <a:off x="5239122" y="4725144"/>
-            <a:ext cx="1716192" cy="1008112"/>
-          </a:xfrm>
-          <a:prstGeom prst="rect">
-            <a:avLst/>
-          </a:prstGeom>
-          <a:noFill/>
-          <a:ln w="9525">
-            <a:noFill/>
-            <a:miter lim="800000"/>
-            <a:headEnd/>
-            <a:tailEnd/>
-          </a:ln>
-        </p:spPr>
-      </p:pic>
-      <p:sp>
-        <p:nvSpPr>
-          <p:cNvPr id="121" name="Tekstvak 120"/>
-          <p:cNvSpPr txBox="1"/>
-          <p:nvPr/>
-        </p:nvSpPr>
-        <p:spPr>
-          <a:xfrm>
-            <a:off x="7092280" y="4941168"/>
-            <a:ext cx="1224136" cy="646331"/>
-          </a:xfrm>
-          <a:prstGeom prst="rect">
-            <a:avLst/>
-          </a:prstGeom>
-          <a:noFill/>
-        </p:spPr>
-        <p:txBody>
-          <a:bodyPr wrap="square" rtlCol="0">
-            <a:spAutoFit/>
-          </a:bodyPr>
-          <a:lstStyle/>
-          <a:p>
-            <a:pPr algn="ctr"/>
-            <a:r>
-              <a:rPr lang="en-US" sz="1200" dirty="0" err="1" smtClean="0"/>
-              <a:t>PlaatEnergy</a:t>
-            </a:r>
-            <a:endParaRPr lang="en-US" sz="1200" dirty="0" smtClean="0"/>
-          </a:p>
-          <a:p>
-            <a:pPr algn="ctr"/>
-            <a:r>
-              <a:rPr lang="en-US" sz="1200" dirty="0" smtClean="0"/>
-              <a:t>Slide on attach</a:t>
-            </a:r>
-          </a:p>
-          <a:p>
-            <a:pPr algn="ctr"/>
-            <a:r>
-              <a:rPr lang="en-US" sz="1200" dirty="0" smtClean="0"/>
-              <a:t>monitor</a:t>
             </a:r>
             <a:endParaRPr lang="nl-NL" sz="1200" dirty="0"/>
           </a:p>
@@ -10604,8 +10417,8 @@
         </p:blipFill>
         <p:spPr bwMode="auto">
           <a:xfrm>
-            <a:off x="251520" y="5229200"/>
-            <a:ext cx="1916236" cy="1628800"/>
+            <a:off x="107504" y="5229200"/>
+            <a:ext cx="1746805" cy="1484784"/>
           </a:xfrm>
           <a:prstGeom prst="rect">
             <a:avLst/>
@@ -10630,8 +10443,8 @@
         </p:blipFill>
         <p:spPr bwMode="auto">
           <a:xfrm>
-            <a:off x="395536" y="5445224"/>
-            <a:ext cx="1080120" cy="785183"/>
+            <a:off x="251520" y="5445225"/>
+            <a:ext cx="1008112" cy="680492"/>
           </a:xfrm>
           <a:prstGeom prst="rect">
             <a:avLst/>

</xml_diff>

<commit_message>
Update presentation for thursday event
</commit_message>
<xml_diff>
--- a/doc/ppt/PlaatEnergy Design.pptx
+++ b/doc/ppt/PlaatEnergy Design.pptx
@@ -214,7 +214,7 @@
             <a:fld id="{AAA9B6CD-1D48-452A-A7F2-8CBBE02CC7D2}" type="datetimeFigureOut">
               <a:rPr lang="nl-NL" smtClean="0"/>
               <a:pPr/>
-              <a:t>4-7-2016</a:t>
+              <a:t>5-7-2016</a:t>
             </a:fld>
             <a:endParaRPr lang="nl-NL"/>
           </a:p>
@@ -678,7 +678,7 @@
             <a:fld id="{96BAE843-BE96-40CB-B634-F63C679A4CF5}" type="datetimeFigureOut">
               <a:rPr lang="nl-NL" smtClean="0"/>
               <a:pPr/>
-              <a:t>4-7-2016</a:t>
+              <a:t>5-7-2016</a:t>
             </a:fld>
             <a:endParaRPr lang="nl-NL"/>
           </a:p>
@@ -845,7 +845,7 @@
             <a:fld id="{96BAE843-BE96-40CB-B634-F63C679A4CF5}" type="datetimeFigureOut">
               <a:rPr lang="nl-NL" smtClean="0"/>
               <a:pPr/>
-              <a:t>4-7-2016</a:t>
+              <a:t>5-7-2016</a:t>
             </a:fld>
             <a:endParaRPr lang="nl-NL"/>
           </a:p>
@@ -1022,7 +1022,7 @@
             <a:fld id="{96BAE843-BE96-40CB-B634-F63C679A4CF5}" type="datetimeFigureOut">
               <a:rPr lang="nl-NL" smtClean="0"/>
               <a:pPr/>
-              <a:t>4-7-2016</a:t>
+              <a:t>5-7-2016</a:t>
             </a:fld>
             <a:endParaRPr lang="nl-NL"/>
           </a:p>
@@ -1207,7 +1207,7 @@
             <a:fld id="{96BAE843-BE96-40CB-B634-F63C679A4CF5}" type="datetimeFigureOut">
               <a:rPr lang="nl-NL" smtClean="0"/>
               <a:pPr/>
-              <a:t>4-7-2016</a:t>
+              <a:t>5-7-2016</a:t>
             </a:fld>
             <a:endParaRPr lang="nl-NL"/>
           </a:p>
@@ -1471,7 +1471,7 @@
             <a:fld id="{96BAE843-BE96-40CB-B634-F63C679A4CF5}" type="datetimeFigureOut">
               <a:rPr lang="nl-NL" smtClean="0"/>
               <a:pPr/>
-              <a:t>4-7-2016</a:t>
+              <a:t>5-7-2016</a:t>
             </a:fld>
             <a:endParaRPr lang="nl-NL"/>
           </a:p>
@@ -1821,7 +1821,7 @@
             <a:fld id="{96BAE843-BE96-40CB-B634-F63C679A4CF5}" type="datetimeFigureOut">
               <a:rPr lang="nl-NL" smtClean="0"/>
               <a:pPr/>
-              <a:t>4-7-2016</a:t>
+              <a:t>5-7-2016</a:t>
             </a:fld>
             <a:endParaRPr lang="nl-NL"/>
           </a:p>
@@ -2131,7 +2131,7 @@
             <a:fld id="{96BAE843-BE96-40CB-B634-F63C679A4CF5}" type="datetimeFigureOut">
               <a:rPr lang="nl-NL" smtClean="0"/>
               <a:pPr/>
-              <a:t>4-7-2016</a:t>
+              <a:t>5-7-2016</a:t>
             </a:fld>
             <a:endParaRPr lang="nl-NL"/>
           </a:p>
@@ -2360,7 +2360,7 @@
             <a:fld id="{96BAE843-BE96-40CB-B634-F63C679A4CF5}" type="datetimeFigureOut">
               <a:rPr lang="nl-NL" smtClean="0"/>
               <a:pPr/>
-              <a:t>4-7-2016</a:t>
+              <a:t>5-7-2016</a:t>
             </a:fld>
             <a:endParaRPr lang="nl-NL"/>
           </a:p>
@@ -2452,7 +2452,7 @@
             <a:fld id="{96BAE843-BE96-40CB-B634-F63C679A4CF5}" type="datetimeFigureOut">
               <a:rPr lang="nl-NL" smtClean="0"/>
               <a:pPr/>
-              <a:t>4-7-2016</a:t>
+              <a:t>5-7-2016</a:t>
             </a:fld>
             <a:endParaRPr lang="nl-NL"/>
           </a:p>
@@ -2742,7 +2742,7 @@
             <a:fld id="{96BAE843-BE96-40CB-B634-F63C679A4CF5}" type="datetimeFigureOut">
               <a:rPr lang="nl-NL" smtClean="0"/>
               <a:pPr/>
-              <a:t>4-7-2016</a:t>
+              <a:t>5-7-2016</a:t>
             </a:fld>
             <a:endParaRPr lang="nl-NL"/>
           </a:p>
@@ -3013,7 +3013,7 @@
             <a:fld id="{96BAE843-BE96-40CB-B634-F63C679A4CF5}" type="datetimeFigureOut">
               <a:rPr lang="nl-NL" smtClean="0"/>
               <a:pPr/>
-              <a:t>4-7-2016</a:t>
+              <a:t>5-7-2016</a:t>
             </a:fld>
             <a:endParaRPr lang="nl-NL"/>
           </a:p>
@@ -3225,7 +3225,7 @@
             <a:fld id="{96BAE843-BE96-40CB-B634-F63C679A4CF5}" type="datetimeFigureOut">
               <a:rPr lang="nl-NL" smtClean="0"/>
               <a:pPr/>
-              <a:t>4-7-2016</a:t>
+              <a:t>5-7-2016</a:t>
             </a:fld>
             <a:endParaRPr lang="nl-NL"/>
           </a:p>
@@ -6163,7 +6163,7 @@
         </p:blipFill>
         <p:spPr bwMode="auto">
           <a:xfrm>
-            <a:off x="6300192" y="2636912"/>
+            <a:off x="6280847" y="2372309"/>
             <a:ext cx="1135013" cy="1135013"/>
           </a:xfrm>
           <a:prstGeom prst="rect">
@@ -10377,7 +10377,6 @@
               <a:rPr lang="en-US" dirty="0" smtClean="0"/>
               <a:t>WS / JSON</a:t>
             </a:r>
-            <a:endParaRPr lang="en-US" dirty="0" smtClean="0"/>
           </a:p>
         </p:txBody>
       </p:sp>
@@ -10777,8 +10776,12 @@
               <a:buChar char="-"/>
             </a:pPr>
             <a:r>
-              <a:rPr lang="nl-NL" dirty="0" err="1" smtClean="0"/>
-              <a:t>kamstrup</a:t>
+              <a:rPr lang="nl-NL" dirty="0" err="1"/>
+              <a:t>K</a:t>
+            </a:r>
+            <a:r>
+              <a:rPr lang="nl-NL" smtClean="0"/>
+              <a:t>amstrup</a:t>
             </a:r>
             <a:endParaRPr lang="nl-NL" dirty="0" smtClean="0"/>
           </a:p>

</xml_diff>